<commit_message>
add Powerpoit and example halconwpf
</commit_message>
<xml_diff>
--- a/Training_wpf(sp).pptx
+++ b/Training_wpf(sp).pptx
@@ -5,13 +5,17 @@
     <p:sldMasterId id="2147483660" r:id="rId1"/>
   </p:sldMasterIdLst>
   <p:notesMasterIdLst>
-    <p:notesMasterId r:id="rId6"/>
+    <p:notesMasterId r:id="rId10"/>
   </p:notesMasterIdLst>
   <p:sldIdLst>
     <p:sldId id="257" r:id="rId2"/>
     <p:sldId id="259" r:id="rId3"/>
     <p:sldId id="260" r:id="rId4"/>
     <p:sldId id="261" r:id="rId5"/>
+    <p:sldId id="262" r:id="rId6"/>
+    <p:sldId id="263" r:id="rId7"/>
+    <p:sldId id="264" r:id="rId8"/>
+    <p:sldId id="265" r:id="rId9"/>
   </p:sldIdLst>
   <p:sldSz cx="12192000" cy="6858000"/>
   <p:notesSz cx="6858000" cy="9144000"/>
@@ -119,9 +123,16 @@
             <p14:sldId id="259"/>
             <p14:sldId id="260"/>
             <p14:sldId id="261"/>
+            <p14:sldId id="262"/>
+            <p14:sldId id="263"/>
+            <p14:sldId id="264"/>
+            <p14:sldId id="265"/>
           </p14:sldIdLst>
         </p14:section>
       </p14:sectionLst>
+    </p:ext>
+    <p:ext uri="{EFAFB233-063F-42B5-8137-9DF3F51BA10A}">
+      <p15:sldGuideLst xmlns:p15="http://schemas.microsoft.com/office/powerpoint/2012/main"/>
     </p:ext>
   </p:extLst>
 </p:presentation>
@@ -9106,6 +9117,2210 @@
 </p:sld>
 </file>
 
+<file path=ppt/slides/slide5.xml><?xml version="1.0" encoding="utf-8"?>
+<p:sld xmlns:a="http://schemas.openxmlformats.org/drawingml/2006/main" xmlns:r="http://schemas.openxmlformats.org/officeDocument/2006/relationships" xmlns:p="http://schemas.openxmlformats.org/presentationml/2006/main">
+  <p:cSld>
+    <p:spTree>
+      <p:nvGrpSpPr>
+        <p:cNvPr id="1" name=""/>
+        <p:cNvGrpSpPr/>
+        <p:nvPr/>
+      </p:nvGrpSpPr>
+      <p:grpSpPr>
+        <a:xfrm>
+          <a:off x="0" y="0"/>
+          <a:ext cx="0" cy="0"/>
+          <a:chOff x="0" y="0"/>
+          <a:chExt cx="0" cy="0"/>
+        </a:xfrm>
+      </p:grpSpPr>
+      <p:pic>
+        <p:nvPicPr>
+          <p:cNvPr id="10" name="Picture 9" descr="A picture containing text, monitor, screenshot, indoor&#10;&#10;Description automatically generated">
+            <a:extLst>
+              <a:ext uri="{FF2B5EF4-FFF2-40B4-BE49-F238E27FC236}">
+                <a16:creationId xmlns:a16="http://schemas.microsoft.com/office/drawing/2014/main" id="{CE345E57-6D90-45B7-AEB7-39801B884405}"/>
+              </a:ext>
+            </a:extLst>
+          </p:cNvPr>
+          <p:cNvPicPr>
+            <a:picLocks noChangeAspect="1"/>
+          </p:cNvPicPr>
+          <p:nvPr/>
+        </p:nvPicPr>
+        <p:blipFill>
+          <a:blip r:embed="rId2">
+            <a:extLst>
+              <a:ext uri="{28A0092B-C50C-407E-A947-70E740481C1C}">
+                <a14:useLocalDpi xmlns:a14="http://schemas.microsoft.com/office/drawing/2010/main" val="0"/>
+              </a:ext>
+            </a:extLst>
+          </a:blip>
+          <a:stretch>
+            <a:fillRect/>
+          </a:stretch>
+        </p:blipFill>
+        <p:spPr>
+          <a:xfrm>
+            <a:off x="369455" y="758372"/>
+            <a:ext cx="11397672" cy="5676295"/>
+          </a:xfrm>
+          <a:prstGeom prst="rect">
+            <a:avLst/>
+          </a:prstGeom>
+        </p:spPr>
+      </p:pic>
+      <p:sp>
+        <p:nvSpPr>
+          <p:cNvPr id="11" name="Rectangle 10">
+            <a:extLst>
+              <a:ext uri="{FF2B5EF4-FFF2-40B4-BE49-F238E27FC236}">
+                <a16:creationId xmlns:a16="http://schemas.microsoft.com/office/drawing/2014/main" id="{C9FFA65C-68B3-4E0B-BD6C-35172AA83B3D}"/>
+              </a:ext>
+            </a:extLst>
+          </p:cNvPr>
+          <p:cNvSpPr/>
+          <p:nvPr/>
+        </p:nvSpPr>
+        <p:spPr>
+          <a:xfrm>
+            <a:off x="6341533" y="2683933"/>
+            <a:ext cx="2599267" cy="939800"/>
+          </a:xfrm>
+          <a:prstGeom prst="rect">
+            <a:avLst/>
+          </a:prstGeom>
+          <a:pattFill prst="lgGrid">
+            <a:fgClr>
+              <a:srgbClr val="FFFF00"/>
+            </a:fgClr>
+            <a:bgClr>
+              <a:schemeClr val="bg1"/>
+            </a:bgClr>
+          </a:pattFill>
+          <a:ln>
+            <a:solidFill>
+              <a:schemeClr val="tx1"/>
+            </a:solidFill>
+          </a:ln>
+        </p:spPr>
+        <p:style>
+          <a:lnRef idx="2">
+            <a:schemeClr val="accent1">
+              <a:shade val="50000"/>
+            </a:schemeClr>
+          </a:lnRef>
+          <a:fillRef idx="1">
+            <a:schemeClr val="accent1"/>
+          </a:fillRef>
+          <a:effectRef idx="0">
+            <a:schemeClr val="accent1"/>
+          </a:effectRef>
+          <a:fontRef idx="minor">
+            <a:schemeClr val="lt1"/>
+          </a:fontRef>
+        </p:style>
+        <p:txBody>
+          <a:bodyPr rtlCol="0" anchor="ctr"/>
+          <a:lstStyle/>
+          <a:p>
+            <a:pPr algn="ctr"/>
+            <a:endParaRPr lang="en-US"/>
+          </a:p>
+        </p:txBody>
+      </p:sp>
+    </p:spTree>
+    <p:extLst>
+      <p:ext uri="{BB962C8B-B14F-4D97-AF65-F5344CB8AC3E}">
+        <p14:creationId xmlns:p14="http://schemas.microsoft.com/office/powerpoint/2010/main" val="293898010"/>
+      </p:ext>
+    </p:extLst>
+  </p:cSld>
+  <p:clrMapOvr>
+    <a:masterClrMapping/>
+  </p:clrMapOvr>
+</p:sld>
+</file>
+
+<file path=ppt/slides/slide6.xml><?xml version="1.0" encoding="utf-8"?>
+<p:sld xmlns:a="http://schemas.openxmlformats.org/drawingml/2006/main" xmlns:r="http://schemas.openxmlformats.org/officeDocument/2006/relationships" xmlns:p="http://schemas.openxmlformats.org/presentationml/2006/main">
+  <p:cSld>
+    <p:spTree>
+      <p:nvGrpSpPr>
+        <p:cNvPr id="1" name=""/>
+        <p:cNvGrpSpPr/>
+        <p:nvPr/>
+      </p:nvGrpSpPr>
+      <p:grpSpPr>
+        <a:xfrm>
+          <a:off x="0" y="0"/>
+          <a:ext cx="0" cy="0"/>
+          <a:chOff x="0" y="0"/>
+          <a:chExt cx="0" cy="0"/>
+        </a:xfrm>
+      </p:grpSpPr>
+      <p:graphicFrame>
+        <p:nvGraphicFramePr>
+          <p:cNvPr id="4" name="Table 4">
+            <a:extLst>
+              <a:ext uri="{FF2B5EF4-FFF2-40B4-BE49-F238E27FC236}">
+                <a16:creationId xmlns:a16="http://schemas.microsoft.com/office/drawing/2014/main" id="{CD02468B-E45D-4F5A-BEEB-99CE25B5BDAD}"/>
+              </a:ext>
+            </a:extLst>
+          </p:cNvPr>
+          <p:cNvGraphicFramePr>
+            <a:graphicFrameLocks noGrp="1"/>
+          </p:cNvGraphicFramePr>
+          <p:nvPr>
+            <p:extLst>
+              <p:ext uri="{D42A27DB-BD31-4B8C-83A1-F6EECF244321}">
+                <p14:modId xmlns:p14="http://schemas.microsoft.com/office/powerpoint/2010/main" val="1042041459"/>
+              </p:ext>
+            </p:extLst>
+          </p:nvPr>
+        </p:nvGraphicFramePr>
+        <p:xfrm>
+          <a:off x="1071419" y="1060766"/>
+          <a:ext cx="4719080" cy="3279464"/>
+        </p:xfrm>
+        <a:graphic>
+          <a:graphicData uri="http://schemas.openxmlformats.org/drawingml/2006/table">
+            <a:tbl>
+              <a:tblPr firstRow="1" bandRow="1">
+                <a:tableStyleId>{5C22544A-7EE6-4342-B048-85BDC9FD1C3A}</a:tableStyleId>
+              </a:tblPr>
+              <a:tblGrid>
+                <a:gridCol w="1179770">
+                  <a:extLst>
+                    <a:ext uri="{9D8B030D-6E8A-4147-A177-3AD203B41FA5}">
+                      <a16:colId xmlns:a16="http://schemas.microsoft.com/office/drawing/2014/main" val="1245473916"/>
+                    </a:ext>
+                  </a:extLst>
+                </a:gridCol>
+                <a:gridCol w="1179770">
+                  <a:extLst>
+                    <a:ext uri="{9D8B030D-6E8A-4147-A177-3AD203B41FA5}">
+                      <a16:colId xmlns:a16="http://schemas.microsoft.com/office/drawing/2014/main" val="2452012557"/>
+                    </a:ext>
+                  </a:extLst>
+                </a:gridCol>
+                <a:gridCol w="1179770">
+                  <a:extLst>
+                    <a:ext uri="{9D8B030D-6E8A-4147-A177-3AD203B41FA5}">
+                      <a16:colId xmlns:a16="http://schemas.microsoft.com/office/drawing/2014/main" val="3216941596"/>
+                    </a:ext>
+                  </a:extLst>
+                </a:gridCol>
+                <a:gridCol w="1179770">
+                  <a:extLst>
+                    <a:ext uri="{9D8B030D-6E8A-4147-A177-3AD203B41FA5}">
+                      <a16:colId xmlns:a16="http://schemas.microsoft.com/office/drawing/2014/main" val="2854911316"/>
+                    </a:ext>
+                  </a:extLst>
+                </a:gridCol>
+              </a:tblGrid>
+              <a:tr h="848248">
+                <a:tc>
+                  <a:txBody>
+                    <a:bodyPr/>
+                    <a:lstStyle/>
+                    <a:p>
+                      <a:pPr algn="ctr"/>
+                      <a:endParaRPr lang="en-US" sz="1700" dirty="0">
+                        <a:solidFill>
+                          <a:schemeClr val="tx1">
+                            <a:lumMod val="50000"/>
+                          </a:schemeClr>
+                        </a:solidFill>
+                      </a:endParaRPr>
+                    </a:p>
+                    <a:p>
+                      <a:pPr algn="ctr"/>
+                      <a:r>
+                        <a:rPr lang="en-US" sz="1700" dirty="0">
+                          <a:solidFill>
+                            <a:schemeClr val="tx1">
+                              <a:lumMod val="50000"/>
+                            </a:schemeClr>
+                          </a:solidFill>
+                        </a:rPr>
+                        <a:t>0,0</a:t>
+                      </a:r>
+                    </a:p>
+                  </a:txBody>
+                  <a:tcPr marL="65250" marR="65250" marT="32625" marB="32625">
+                    <a:lnL w="12700" cap="flat" cmpd="sng" algn="ctr">
+                      <a:solidFill>
+                        <a:schemeClr val="tx1"/>
+                      </a:solidFill>
+                      <a:prstDash val="solid"/>
+                      <a:round/>
+                      <a:headEnd type="none" w="med" len="med"/>
+                      <a:tailEnd type="none" w="med" len="med"/>
+                    </a:lnL>
+                    <a:lnR w="12700" cap="flat" cmpd="sng" algn="ctr">
+                      <a:solidFill>
+                        <a:schemeClr val="tx1"/>
+                      </a:solidFill>
+                      <a:prstDash val="solid"/>
+                      <a:round/>
+                      <a:headEnd type="none" w="med" len="med"/>
+                      <a:tailEnd type="none" w="med" len="med"/>
+                    </a:lnR>
+                    <a:lnT w="12700" cap="flat" cmpd="sng" algn="ctr">
+                      <a:solidFill>
+                        <a:schemeClr val="tx1"/>
+                      </a:solidFill>
+                      <a:prstDash val="solid"/>
+                      <a:round/>
+                      <a:headEnd type="none" w="med" len="med"/>
+                      <a:tailEnd type="none" w="med" len="med"/>
+                    </a:lnT>
+                    <a:lnB w="12700" cap="flat" cmpd="sng" algn="ctr">
+                      <a:solidFill>
+                        <a:schemeClr val="tx1"/>
+                      </a:solidFill>
+                      <a:prstDash val="solid"/>
+                      <a:round/>
+                      <a:headEnd type="none" w="med" len="med"/>
+                      <a:tailEnd type="none" w="med" len="med"/>
+                    </a:lnB>
+                    <a:noFill/>
+                  </a:tcPr>
+                </a:tc>
+                <a:tc>
+                  <a:txBody>
+                    <a:bodyPr/>
+                    <a:lstStyle/>
+                    <a:p>
+                      <a:pPr marL="0" marR="0" lvl="0" indent="0" algn="ctr" defTabSz="914400" rtl="0" eaLnBrk="1" fontAlgn="auto" latinLnBrk="0" hangingPunct="1">
+                        <a:lnSpc>
+                          <a:spcPct val="100000"/>
+                        </a:lnSpc>
+                        <a:spcBef>
+                          <a:spcPts val="0"/>
+                        </a:spcBef>
+                        <a:spcAft>
+                          <a:spcPts val="0"/>
+                        </a:spcAft>
+                        <a:buClr>
+                          <a:srgbClr val="000000"/>
+                        </a:buClr>
+                        <a:buSzTx/>
+                        <a:buFont typeface="Arial"/>
+                        <a:buNone/>
+                        <a:tabLst/>
+                        <a:defRPr/>
+                      </a:pPr>
+                      <a:endParaRPr lang="en-US" sz="1700" dirty="0"/>
+                    </a:p>
+                    <a:p>
+                      <a:pPr marL="0" marR="0" lvl="0" indent="0" algn="ctr" defTabSz="914400" rtl="0" eaLnBrk="1" fontAlgn="auto" latinLnBrk="0" hangingPunct="1">
+                        <a:lnSpc>
+                          <a:spcPct val="100000"/>
+                        </a:lnSpc>
+                        <a:spcBef>
+                          <a:spcPts val="0"/>
+                        </a:spcBef>
+                        <a:spcAft>
+                          <a:spcPts val="0"/>
+                        </a:spcAft>
+                        <a:buClr>
+                          <a:srgbClr val="000000"/>
+                        </a:buClr>
+                        <a:buSzTx/>
+                        <a:buFont typeface="Arial"/>
+                        <a:buNone/>
+                        <a:tabLst/>
+                        <a:defRPr/>
+                      </a:pPr>
+                      <a:r>
+                        <a:rPr lang="en-US" sz="1700" dirty="0"/>
+                        <a:t> </a:t>
+                      </a:r>
+                      <a:r>
+                        <a:rPr lang="en-US" sz="1700" dirty="0">
+                          <a:solidFill>
+                            <a:schemeClr val="tx1">
+                              <a:lumMod val="50000"/>
+                            </a:schemeClr>
+                          </a:solidFill>
+                        </a:rPr>
+                        <a:t>0,1</a:t>
+                      </a:r>
+                    </a:p>
+                    <a:p>
+                      <a:pPr algn="ctr"/>
+                      <a:endParaRPr lang="en-US" sz="1700" dirty="0"/>
+                    </a:p>
+                  </a:txBody>
+                  <a:tcPr marL="65250" marR="65250" marT="32625" marB="32625">
+                    <a:lnL w="12700" cap="flat" cmpd="sng" algn="ctr">
+                      <a:solidFill>
+                        <a:schemeClr val="tx1"/>
+                      </a:solidFill>
+                      <a:prstDash val="solid"/>
+                      <a:round/>
+                      <a:headEnd type="none" w="med" len="med"/>
+                      <a:tailEnd type="none" w="med" len="med"/>
+                    </a:lnL>
+                    <a:lnR w="12700" cap="flat" cmpd="sng" algn="ctr">
+                      <a:solidFill>
+                        <a:schemeClr val="tx1"/>
+                      </a:solidFill>
+                      <a:prstDash val="solid"/>
+                      <a:round/>
+                      <a:headEnd type="none" w="med" len="med"/>
+                      <a:tailEnd type="none" w="med" len="med"/>
+                    </a:lnR>
+                    <a:lnT w="12700" cap="flat" cmpd="sng" algn="ctr">
+                      <a:solidFill>
+                        <a:schemeClr val="tx1"/>
+                      </a:solidFill>
+                      <a:prstDash val="solid"/>
+                      <a:round/>
+                      <a:headEnd type="none" w="med" len="med"/>
+                      <a:tailEnd type="none" w="med" len="med"/>
+                    </a:lnT>
+                    <a:lnB w="12700" cap="flat" cmpd="sng" algn="ctr">
+                      <a:solidFill>
+                        <a:schemeClr val="tx1"/>
+                      </a:solidFill>
+                      <a:prstDash val="solid"/>
+                      <a:round/>
+                      <a:headEnd type="none" w="med" len="med"/>
+                      <a:tailEnd type="none" w="med" len="med"/>
+                    </a:lnB>
+                    <a:noFill/>
+                  </a:tcPr>
+                </a:tc>
+                <a:tc>
+                  <a:txBody>
+                    <a:bodyPr/>
+                    <a:lstStyle/>
+                    <a:p>
+                      <a:endParaRPr lang="en-US" sz="1000" dirty="0"/>
+                    </a:p>
+                  </a:txBody>
+                  <a:tcPr marL="65250" marR="65250" marT="32625" marB="32625">
+                    <a:lnL w="12700" cap="flat" cmpd="sng" algn="ctr">
+                      <a:solidFill>
+                        <a:schemeClr val="tx1"/>
+                      </a:solidFill>
+                      <a:prstDash val="solid"/>
+                      <a:round/>
+                      <a:headEnd type="none" w="med" len="med"/>
+                      <a:tailEnd type="none" w="med" len="med"/>
+                    </a:lnL>
+                    <a:lnR w="12700" cap="flat" cmpd="sng" algn="ctr">
+                      <a:solidFill>
+                        <a:schemeClr val="tx1"/>
+                      </a:solidFill>
+                      <a:prstDash val="solid"/>
+                      <a:round/>
+                      <a:headEnd type="none" w="med" len="med"/>
+                      <a:tailEnd type="none" w="med" len="med"/>
+                    </a:lnR>
+                    <a:lnT w="12700" cap="flat" cmpd="sng" algn="ctr">
+                      <a:solidFill>
+                        <a:schemeClr val="tx1"/>
+                      </a:solidFill>
+                      <a:prstDash val="solid"/>
+                      <a:round/>
+                      <a:headEnd type="none" w="med" len="med"/>
+                      <a:tailEnd type="none" w="med" len="med"/>
+                    </a:lnT>
+                    <a:lnB w="12700" cap="flat" cmpd="sng" algn="ctr">
+                      <a:solidFill>
+                        <a:schemeClr val="tx1"/>
+                      </a:solidFill>
+                      <a:prstDash val="solid"/>
+                      <a:round/>
+                      <a:headEnd type="none" w="med" len="med"/>
+                      <a:tailEnd type="none" w="med" len="med"/>
+                    </a:lnB>
+                    <a:noFill/>
+                  </a:tcPr>
+                </a:tc>
+                <a:tc>
+                  <a:txBody>
+                    <a:bodyPr/>
+                    <a:lstStyle/>
+                    <a:p>
+                      <a:endParaRPr lang="en-US" sz="1000"/>
+                    </a:p>
+                  </a:txBody>
+                  <a:tcPr marL="65250" marR="65250" marT="32625" marB="32625">
+                    <a:lnL w="12700" cap="flat" cmpd="sng" algn="ctr">
+                      <a:solidFill>
+                        <a:schemeClr val="tx1"/>
+                      </a:solidFill>
+                      <a:prstDash val="solid"/>
+                      <a:round/>
+                      <a:headEnd type="none" w="med" len="med"/>
+                      <a:tailEnd type="none" w="med" len="med"/>
+                    </a:lnL>
+                    <a:lnR w="12700" cap="flat" cmpd="sng" algn="ctr">
+                      <a:solidFill>
+                        <a:schemeClr val="tx1"/>
+                      </a:solidFill>
+                      <a:prstDash val="solid"/>
+                      <a:round/>
+                      <a:headEnd type="none" w="med" len="med"/>
+                      <a:tailEnd type="none" w="med" len="med"/>
+                    </a:lnR>
+                    <a:lnT w="12700" cap="flat" cmpd="sng" algn="ctr">
+                      <a:solidFill>
+                        <a:schemeClr val="tx1"/>
+                      </a:solidFill>
+                      <a:prstDash val="solid"/>
+                      <a:round/>
+                      <a:headEnd type="none" w="med" len="med"/>
+                      <a:tailEnd type="none" w="med" len="med"/>
+                    </a:lnT>
+                    <a:lnB w="12700" cap="flat" cmpd="sng" algn="ctr">
+                      <a:solidFill>
+                        <a:schemeClr val="tx1"/>
+                      </a:solidFill>
+                      <a:prstDash val="solid"/>
+                      <a:round/>
+                      <a:headEnd type="none" w="med" len="med"/>
+                      <a:tailEnd type="none" w="med" len="med"/>
+                    </a:lnB>
+                    <a:noFill/>
+                  </a:tcPr>
+                </a:tc>
+                <a:extLst>
+                  <a:ext uri="{0D108BD9-81ED-4DB2-BD59-A6C34878D82A}">
+                    <a16:rowId xmlns:a16="http://schemas.microsoft.com/office/drawing/2014/main" val="121281913"/>
+                  </a:ext>
+                </a:extLst>
+              </a:tr>
+              <a:tr h="848248">
+                <a:tc>
+                  <a:txBody>
+                    <a:bodyPr/>
+                    <a:lstStyle/>
+                    <a:p>
+                      <a:pPr marL="0" marR="0" lvl="0" indent="0" algn="ctr" defTabSz="914400" rtl="0" eaLnBrk="1" fontAlgn="auto" latinLnBrk="0" hangingPunct="1">
+                        <a:lnSpc>
+                          <a:spcPct val="100000"/>
+                        </a:lnSpc>
+                        <a:spcBef>
+                          <a:spcPts val="0"/>
+                        </a:spcBef>
+                        <a:spcAft>
+                          <a:spcPts val="0"/>
+                        </a:spcAft>
+                        <a:buClr>
+                          <a:srgbClr val="000000"/>
+                        </a:buClr>
+                        <a:buSzTx/>
+                        <a:buFont typeface="Arial"/>
+                        <a:buNone/>
+                        <a:tabLst/>
+                        <a:defRPr/>
+                      </a:pPr>
+                      <a:endParaRPr lang="en-US" sz="1700" b="1" dirty="0">
+                        <a:solidFill>
+                          <a:schemeClr val="tx1">
+                            <a:lumMod val="50000"/>
+                          </a:schemeClr>
+                        </a:solidFill>
+                      </a:endParaRPr>
+                    </a:p>
+                    <a:p>
+                      <a:pPr marL="0" marR="0" lvl="0" indent="0" algn="ctr" defTabSz="914400" rtl="0" eaLnBrk="1" fontAlgn="auto" latinLnBrk="0" hangingPunct="1">
+                        <a:lnSpc>
+                          <a:spcPct val="100000"/>
+                        </a:lnSpc>
+                        <a:spcBef>
+                          <a:spcPts val="0"/>
+                        </a:spcBef>
+                        <a:spcAft>
+                          <a:spcPts val="0"/>
+                        </a:spcAft>
+                        <a:buClr>
+                          <a:srgbClr val="000000"/>
+                        </a:buClr>
+                        <a:buSzTx/>
+                        <a:buFont typeface="Arial"/>
+                        <a:buNone/>
+                        <a:tabLst/>
+                        <a:defRPr/>
+                      </a:pPr>
+                      <a:r>
+                        <a:rPr lang="en-US" sz="1700" b="1" dirty="0">
+                          <a:solidFill>
+                            <a:schemeClr val="tx1">
+                              <a:lumMod val="50000"/>
+                            </a:schemeClr>
+                          </a:solidFill>
+                        </a:rPr>
+                        <a:t>1,0</a:t>
+                      </a:r>
+                    </a:p>
+                    <a:p>
+                      <a:pPr algn="ctr"/>
+                      <a:endParaRPr lang="en-US" sz="1700" dirty="0"/>
+                    </a:p>
+                  </a:txBody>
+                  <a:tcPr marL="65250" marR="65250" marT="32625" marB="32625">
+                    <a:lnL w="12700" cap="flat" cmpd="sng" algn="ctr">
+                      <a:solidFill>
+                        <a:schemeClr val="tx1"/>
+                      </a:solidFill>
+                      <a:prstDash val="solid"/>
+                      <a:round/>
+                      <a:headEnd type="none" w="med" len="med"/>
+                      <a:tailEnd type="none" w="med" len="med"/>
+                    </a:lnL>
+                    <a:lnR w="12700" cap="flat" cmpd="sng" algn="ctr">
+                      <a:solidFill>
+                        <a:schemeClr val="tx1"/>
+                      </a:solidFill>
+                      <a:prstDash val="solid"/>
+                      <a:round/>
+                      <a:headEnd type="none" w="med" len="med"/>
+                      <a:tailEnd type="none" w="med" len="med"/>
+                    </a:lnR>
+                    <a:lnT w="12700" cap="flat" cmpd="sng" algn="ctr">
+                      <a:solidFill>
+                        <a:schemeClr val="tx1"/>
+                      </a:solidFill>
+                      <a:prstDash val="solid"/>
+                      <a:round/>
+                      <a:headEnd type="none" w="med" len="med"/>
+                      <a:tailEnd type="none" w="med" len="med"/>
+                    </a:lnT>
+                    <a:lnB w="12700" cap="flat" cmpd="sng" algn="ctr">
+                      <a:solidFill>
+                        <a:schemeClr val="tx1"/>
+                      </a:solidFill>
+                      <a:prstDash val="solid"/>
+                      <a:round/>
+                      <a:headEnd type="none" w="med" len="med"/>
+                      <a:tailEnd type="none" w="med" len="med"/>
+                    </a:lnB>
+                    <a:noFill/>
+                  </a:tcPr>
+                </a:tc>
+                <a:tc>
+                  <a:txBody>
+                    <a:bodyPr/>
+                    <a:lstStyle/>
+                    <a:p>
+                      <a:pPr algn="ctr"/>
+                      <a:endParaRPr lang="en-US" sz="1700" dirty="0"/>
+                    </a:p>
+                  </a:txBody>
+                  <a:tcPr marL="65250" marR="65250" marT="32625" marB="32625">
+                    <a:lnL w="12700" cap="flat" cmpd="sng" algn="ctr">
+                      <a:solidFill>
+                        <a:schemeClr val="tx1"/>
+                      </a:solidFill>
+                      <a:prstDash val="solid"/>
+                      <a:round/>
+                      <a:headEnd type="none" w="med" len="med"/>
+                      <a:tailEnd type="none" w="med" len="med"/>
+                    </a:lnL>
+                    <a:lnR w="12700" cap="flat" cmpd="sng" algn="ctr">
+                      <a:solidFill>
+                        <a:schemeClr val="tx1"/>
+                      </a:solidFill>
+                      <a:prstDash val="solid"/>
+                      <a:round/>
+                      <a:headEnd type="none" w="med" len="med"/>
+                      <a:tailEnd type="none" w="med" len="med"/>
+                    </a:lnR>
+                    <a:lnT w="12700" cap="flat" cmpd="sng" algn="ctr">
+                      <a:solidFill>
+                        <a:schemeClr val="tx1"/>
+                      </a:solidFill>
+                      <a:prstDash val="solid"/>
+                      <a:round/>
+                      <a:headEnd type="none" w="med" len="med"/>
+                      <a:tailEnd type="none" w="med" len="med"/>
+                    </a:lnT>
+                    <a:lnB w="12700" cap="flat" cmpd="sng" algn="ctr">
+                      <a:solidFill>
+                        <a:schemeClr val="tx1"/>
+                      </a:solidFill>
+                      <a:prstDash val="solid"/>
+                      <a:round/>
+                      <a:headEnd type="none" w="med" len="med"/>
+                      <a:tailEnd type="none" w="med" len="med"/>
+                    </a:lnB>
+                    <a:noFill/>
+                  </a:tcPr>
+                </a:tc>
+                <a:tc>
+                  <a:txBody>
+                    <a:bodyPr/>
+                    <a:lstStyle/>
+                    <a:p>
+                      <a:endParaRPr lang="en-US" sz="1000"/>
+                    </a:p>
+                  </a:txBody>
+                  <a:tcPr marL="65250" marR="65250" marT="32625" marB="32625">
+                    <a:lnL w="12700" cap="flat" cmpd="sng" algn="ctr">
+                      <a:solidFill>
+                        <a:schemeClr val="tx1"/>
+                      </a:solidFill>
+                      <a:prstDash val="solid"/>
+                      <a:round/>
+                      <a:headEnd type="none" w="med" len="med"/>
+                      <a:tailEnd type="none" w="med" len="med"/>
+                    </a:lnL>
+                    <a:lnR w="12700" cap="flat" cmpd="sng" algn="ctr">
+                      <a:solidFill>
+                        <a:schemeClr val="tx1"/>
+                      </a:solidFill>
+                      <a:prstDash val="solid"/>
+                      <a:round/>
+                      <a:headEnd type="none" w="med" len="med"/>
+                      <a:tailEnd type="none" w="med" len="med"/>
+                    </a:lnR>
+                    <a:lnT w="12700" cap="flat" cmpd="sng" algn="ctr">
+                      <a:solidFill>
+                        <a:schemeClr val="tx1"/>
+                      </a:solidFill>
+                      <a:prstDash val="solid"/>
+                      <a:round/>
+                      <a:headEnd type="none" w="med" len="med"/>
+                      <a:tailEnd type="none" w="med" len="med"/>
+                    </a:lnT>
+                    <a:lnB w="12700" cap="flat" cmpd="sng" algn="ctr">
+                      <a:solidFill>
+                        <a:schemeClr val="tx1"/>
+                      </a:solidFill>
+                      <a:prstDash val="solid"/>
+                      <a:round/>
+                      <a:headEnd type="none" w="med" len="med"/>
+                      <a:tailEnd type="none" w="med" len="med"/>
+                    </a:lnB>
+                    <a:noFill/>
+                  </a:tcPr>
+                </a:tc>
+                <a:tc>
+                  <a:txBody>
+                    <a:bodyPr/>
+                    <a:lstStyle/>
+                    <a:p>
+                      <a:endParaRPr lang="en-US" sz="1000" dirty="0"/>
+                    </a:p>
+                  </a:txBody>
+                  <a:tcPr marL="65250" marR="65250" marT="32625" marB="32625">
+                    <a:lnL w="12700" cap="flat" cmpd="sng" algn="ctr">
+                      <a:solidFill>
+                        <a:schemeClr val="tx1"/>
+                      </a:solidFill>
+                      <a:prstDash val="solid"/>
+                      <a:round/>
+                      <a:headEnd type="none" w="med" len="med"/>
+                      <a:tailEnd type="none" w="med" len="med"/>
+                    </a:lnL>
+                    <a:lnR w="12700" cap="flat" cmpd="sng" algn="ctr">
+                      <a:solidFill>
+                        <a:schemeClr val="tx1"/>
+                      </a:solidFill>
+                      <a:prstDash val="solid"/>
+                      <a:round/>
+                      <a:headEnd type="none" w="med" len="med"/>
+                      <a:tailEnd type="none" w="med" len="med"/>
+                    </a:lnR>
+                    <a:lnT w="12700" cap="flat" cmpd="sng" algn="ctr">
+                      <a:solidFill>
+                        <a:schemeClr val="tx1"/>
+                      </a:solidFill>
+                      <a:prstDash val="solid"/>
+                      <a:round/>
+                      <a:headEnd type="none" w="med" len="med"/>
+                      <a:tailEnd type="none" w="med" len="med"/>
+                    </a:lnT>
+                    <a:lnB w="12700" cap="flat" cmpd="sng" algn="ctr">
+                      <a:solidFill>
+                        <a:schemeClr val="tx1"/>
+                      </a:solidFill>
+                      <a:prstDash val="solid"/>
+                      <a:round/>
+                      <a:headEnd type="none" w="med" len="med"/>
+                      <a:tailEnd type="none" w="med" len="med"/>
+                    </a:lnB>
+                    <a:noFill/>
+                  </a:tcPr>
+                </a:tc>
+                <a:extLst>
+                  <a:ext uri="{0D108BD9-81ED-4DB2-BD59-A6C34878D82A}">
+                    <a16:rowId xmlns:a16="http://schemas.microsoft.com/office/drawing/2014/main" val="2363096651"/>
+                  </a:ext>
+                </a:extLst>
+              </a:tr>
+              <a:tr h="791484">
+                <a:tc>
+                  <a:txBody>
+                    <a:bodyPr/>
+                    <a:lstStyle/>
+                    <a:p>
+                      <a:endParaRPr lang="en-US" sz="1000"/>
+                    </a:p>
+                  </a:txBody>
+                  <a:tcPr marL="65250" marR="65250" marT="32625" marB="32625">
+                    <a:lnL w="12700" cap="flat" cmpd="sng" algn="ctr">
+                      <a:solidFill>
+                        <a:schemeClr val="tx1"/>
+                      </a:solidFill>
+                      <a:prstDash val="solid"/>
+                      <a:round/>
+                      <a:headEnd type="none" w="med" len="med"/>
+                      <a:tailEnd type="none" w="med" len="med"/>
+                    </a:lnL>
+                    <a:lnR w="12700" cap="flat" cmpd="sng" algn="ctr">
+                      <a:solidFill>
+                        <a:schemeClr val="tx1"/>
+                      </a:solidFill>
+                      <a:prstDash val="solid"/>
+                      <a:round/>
+                      <a:headEnd type="none" w="med" len="med"/>
+                      <a:tailEnd type="none" w="med" len="med"/>
+                    </a:lnR>
+                    <a:lnT w="12700" cap="flat" cmpd="sng" algn="ctr">
+                      <a:solidFill>
+                        <a:schemeClr val="tx1"/>
+                      </a:solidFill>
+                      <a:prstDash val="solid"/>
+                      <a:round/>
+                      <a:headEnd type="none" w="med" len="med"/>
+                      <a:tailEnd type="none" w="med" len="med"/>
+                    </a:lnT>
+                    <a:lnB w="12700" cap="flat" cmpd="sng" algn="ctr">
+                      <a:solidFill>
+                        <a:schemeClr val="tx1"/>
+                      </a:solidFill>
+                      <a:prstDash val="solid"/>
+                      <a:round/>
+                      <a:headEnd type="none" w="med" len="med"/>
+                      <a:tailEnd type="none" w="med" len="med"/>
+                    </a:lnB>
+                    <a:noFill/>
+                  </a:tcPr>
+                </a:tc>
+                <a:tc>
+                  <a:txBody>
+                    <a:bodyPr/>
+                    <a:lstStyle/>
+                    <a:p>
+                      <a:endParaRPr lang="en-US" sz="1000"/>
+                    </a:p>
+                  </a:txBody>
+                  <a:tcPr marL="65250" marR="65250" marT="32625" marB="32625">
+                    <a:lnL w="12700" cap="flat" cmpd="sng" algn="ctr">
+                      <a:solidFill>
+                        <a:schemeClr val="tx1"/>
+                      </a:solidFill>
+                      <a:prstDash val="solid"/>
+                      <a:round/>
+                      <a:headEnd type="none" w="med" len="med"/>
+                      <a:tailEnd type="none" w="med" len="med"/>
+                    </a:lnL>
+                    <a:lnR w="12700" cap="flat" cmpd="sng" algn="ctr">
+                      <a:solidFill>
+                        <a:schemeClr val="tx1"/>
+                      </a:solidFill>
+                      <a:prstDash val="solid"/>
+                      <a:round/>
+                      <a:headEnd type="none" w="med" len="med"/>
+                      <a:tailEnd type="none" w="med" len="med"/>
+                    </a:lnR>
+                    <a:lnT w="12700" cap="flat" cmpd="sng" algn="ctr">
+                      <a:solidFill>
+                        <a:schemeClr val="tx1"/>
+                      </a:solidFill>
+                      <a:prstDash val="solid"/>
+                      <a:round/>
+                      <a:headEnd type="none" w="med" len="med"/>
+                      <a:tailEnd type="none" w="med" len="med"/>
+                    </a:lnT>
+                    <a:lnB w="12700" cap="flat" cmpd="sng" algn="ctr">
+                      <a:solidFill>
+                        <a:schemeClr val="tx1"/>
+                      </a:solidFill>
+                      <a:prstDash val="solid"/>
+                      <a:round/>
+                      <a:headEnd type="none" w="med" len="med"/>
+                      <a:tailEnd type="none" w="med" len="med"/>
+                    </a:lnB>
+                    <a:noFill/>
+                  </a:tcPr>
+                </a:tc>
+                <a:tc>
+                  <a:txBody>
+                    <a:bodyPr/>
+                    <a:lstStyle/>
+                    <a:p>
+                      <a:endParaRPr lang="en-US" sz="1000"/>
+                    </a:p>
+                  </a:txBody>
+                  <a:tcPr marL="65250" marR="65250" marT="32625" marB="32625">
+                    <a:lnL w="12700" cap="flat" cmpd="sng" algn="ctr">
+                      <a:solidFill>
+                        <a:schemeClr val="tx1"/>
+                      </a:solidFill>
+                      <a:prstDash val="solid"/>
+                      <a:round/>
+                      <a:headEnd type="none" w="med" len="med"/>
+                      <a:tailEnd type="none" w="med" len="med"/>
+                    </a:lnL>
+                    <a:lnR w="12700" cap="flat" cmpd="sng" algn="ctr">
+                      <a:solidFill>
+                        <a:schemeClr val="tx1"/>
+                      </a:solidFill>
+                      <a:prstDash val="solid"/>
+                      <a:round/>
+                      <a:headEnd type="none" w="med" len="med"/>
+                      <a:tailEnd type="none" w="med" len="med"/>
+                    </a:lnR>
+                    <a:lnT w="12700" cap="flat" cmpd="sng" algn="ctr">
+                      <a:solidFill>
+                        <a:schemeClr val="tx1"/>
+                      </a:solidFill>
+                      <a:prstDash val="solid"/>
+                      <a:round/>
+                      <a:headEnd type="none" w="med" len="med"/>
+                      <a:tailEnd type="none" w="med" len="med"/>
+                    </a:lnT>
+                    <a:lnB w="12700" cap="flat" cmpd="sng" algn="ctr">
+                      <a:solidFill>
+                        <a:schemeClr val="tx1"/>
+                      </a:solidFill>
+                      <a:prstDash val="solid"/>
+                      <a:round/>
+                      <a:headEnd type="none" w="med" len="med"/>
+                      <a:tailEnd type="none" w="med" len="med"/>
+                    </a:lnB>
+                    <a:noFill/>
+                  </a:tcPr>
+                </a:tc>
+                <a:tc>
+                  <a:txBody>
+                    <a:bodyPr/>
+                    <a:lstStyle/>
+                    <a:p>
+                      <a:endParaRPr lang="en-US" sz="1000"/>
+                    </a:p>
+                  </a:txBody>
+                  <a:tcPr marL="65250" marR="65250" marT="32625" marB="32625">
+                    <a:lnL w="12700" cap="flat" cmpd="sng" algn="ctr">
+                      <a:solidFill>
+                        <a:schemeClr val="tx1"/>
+                      </a:solidFill>
+                      <a:prstDash val="solid"/>
+                      <a:round/>
+                      <a:headEnd type="none" w="med" len="med"/>
+                      <a:tailEnd type="none" w="med" len="med"/>
+                    </a:lnL>
+                    <a:lnR w="12700" cap="flat" cmpd="sng" algn="ctr">
+                      <a:solidFill>
+                        <a:schemeClr val="tx1"/>
+                      </a:solidFill>
+                      <a:prstDash val="solid"/>
+                      <a:round/>
+                      <a:headEnd type="none" w="med" len="med"/>
+                      <a:tailEnd type="none" w="med" len="med"/>
+                    </a:lnR>
+                    <a:lnT w="12700" cap="flat" cmpd="sng" algn="ctr">
+                      <a:solidFill>
+                        <a:schemeClr val="tx1"/>
+                      </a:solidFill>
+                      <a:prstDash val="solid"/>
+                      <a:round/>
+                      <a:headEnd type="none" w="med" len="med"/>
+                      <a:tailEnd type="none" w="med" len="med"/>
+                    </a:lnT>
+                    <a:lnB w="12700" cap="flat" cmpd="sng" algn="ctr">
+                      <a:solidFill>
+                        <a:schemeClr val="tx1"/>
+                      </a:solidFill>
+                      <a:prstDash val="solid"/>
+                      <a:round/>
+                      <a:headEnd type="none" w="med" len="med"/>
+                      <a:tailEnd type="none" w="med" len="med"/>
+                    </a:lnB>
+                    <a:noFill/>
+                  </a:tcPr>
+                </a:tc>
+                <a:extLst>
+                  <a:ext uri="{0D108BD9-81ED-4DB2-BD59-A6C34878D82A}">
+                    <a16:rowId xmlns:a16="http://schemas.microsoft.com/office/drawing/2014/main" val="1766026532"/>
+                  </a:ext>
+                </a:extLst>
+              </a:tr>
+              <a:tr h="791484">
+                <a:tc>
+                  <a:txBody>
+                    <a:bodyPr/>
+                    <a:lstStyle/>
+                    <a:p>
+                      <a:endParaRPr lang="en-US" sz="1000"/>
+                    </a:p>
+                  </a:txBody>
+                  <a:tcPr marL="65250" marR="65250" marT="32625" marB="32625">
+                    <a:lnL w="12700" cap="flat" cmpd="sng" algn="ctr">
+                      <a:solidFill>
+                        <a:schemeClr val="tx1"/>
+                      </a:solidFill>
+                      <a:prstDash val="solid"/>
+                      <a:round/>
+                      <a:headEnd type="none" w="med" len="med"/>
+                      <a:tailEnd type="none" w="med" len="med"/>
+                    </a:lnL>
+                    <a:lnR w="12700" cap="flat" cmpd="sng" algn="ctr">
+                      <a:solidFill>
+                        <a:schemeClr val="tx1"/>
+                      </a:solidFill>
+                      <a:prstDash val="solid"/>
+                      <a:round/>
+                      <a:headEnd type="none" w="med" len="med"/>
+                      <a:tailEnd type="none" w="med" len="med"/>
+                    </a:lnR>
+                    <a:lnT w="12700" cap="flat" cmpd="sng" algn="ctr">
+                      <a:solidFill>
+                        <a:schemeClr val="tx1"/>
+                      </a:solidFill>
+                      <a:prstDash val="solid"/>
+                      <a:round/>
+                      <a:headEnd type="none" w="med" len="med"/>
+                      <a:tailEnd type="none" w="med" len="med"/>
+                    </a:lnT>
+                    <a:lnB w="12700" cap="flat" cmpd="sng" algn="ctr">
+                      <a:solidFill>
+                        <a:schemeClr val="tx1"/>
+                      </a:solidFill>
+                      <a:prstDash val="solid"/>
+                      <a:round/>
+                      <a:headEnd type="none" w="med" len="med"/>
+                      <a:tailEnd type="none" w="med" len="med"/>
+                    </a:lnB>
+                    <a:noFill/>
+                  </a:tcPr>
+                </a:tc>
+                <a:tc>
+                  <a:txBody>
+                    <a:bodyPr/>
+                    <a:lstStyle/>
+                    <a:p>
+                      <a:endParaRPr lang="en-US" sz="1000"/>
+                    </a:p>
+                  </a:txBody>
+                  <a:tcPr marL="65250" marR="65250" marT="32625" marB="32625">
+                    <a:lnL w="12700" cap="flat" cmpd="sng" algn="ctr">
+                      <a:solidFill>
+                        <a:schemeClr val="tx1"/>
+                      </a:solidFill>
+                      <a:prstDash val="solid"/>
+                      <a:round/>
+                      <a:headEnd type="none" w="med" len="med"/>
+                      <a:tailEnd type="none" w="med" len="med"/>
+                    </a:lnL>
+                    <a:lnR w="12700" cap="flat" cmpd="sng" algn="ctr">
+                      <a:solidFill>
+                        <a:schemeClr val="tx1"/>
+                      </a:solidFill>
+                      <a:prstDash val="solid"/>
+                      <a:round/>
+                      <a:headEnd type="none" w="med" len="med"/>
+                      <a:tailEnd type="none" w="med" len="med"/>
+                    </a:lnR>
+                    <a:lnT w="12700" cap="flat" cmpd="sng" algn="ctr">
+                      <a:solidFill>
+                        <a:schemeClr val="tx1"/>
+                      </a:solidFill>
+                      <a:prstDash val="solid"/>
+                      <a:round/>
+                      <a:headEnd type="none" w="med" len="med"/>
+                      <a:tailEnd type="none" w="med" len="med"/>
+                    </a:lnT>
+                    <a:lnB w="12700" cap="flat" cmpd="sng" algn="ctr">
+                      <a:solidFill>
+                        <a:schemeClr val="tx1"/>
+                      </a:solidFill>
+                      <a:prstDash val="solid"/>
+                      <a:round/>
+                      <a:headEnd type="none" w="med" len="med"/>
+                      <a:tailEnd type="none" w="med" len="med"/>
+                    </a:lnB>
+                    <a:noFill/>
+                  </a:tcPr>
+                </a:tc>
+                <a:tc>
+                  <a:txBody>
+                    <a:bodyPr/>
+                    <a:lstStyle/>
+                    <a:p>
+                      <a:endParaRPr lang="en-US" sz="1000"/>
+                    </a:p>
+                  </a:txBody>
+                  <a:tcPr marL="65250" marR="65250" marT="32625" marB="32625">
+                    <a:lnL w="12700" cap="flat" cmpd="sng" algn="ctr">
+                      <a:solidFill>
+                        <a:schemeClr val="tx1"/>
+                      </a:solidFill>
+                      <a:prstDash val="solid"/>
+                      <a:round/>
+                      <a:headEnd type="none" w="med" len="med"/>
+                      <a:tailEnd type="none" w="med" len="med"/>
+                    </a:lnL>
+                    <a:lnR w="12700" cap="flat" cmpd="sng" algn="ctr">
+                      <a:solidFill>
+                        <a:schemeClr val="tx1"/>
+                      </a:solidFill>
+                      <a:prstDash val="solid"/>
+                      <a:round/>
+                      <a:headEnd type="none" w="med" len="med"/>
+                      <a:tailEnd type="none" w="med" len="med"/>
+                    </a:lnR>
+                    <a:lnT w="12700" cap="flat" cmpd="sng" algn="ctr">
+                      <a:solidFill>
+                        <a:schemeClr val="tx1"/>
+                      </a:solidFill>
+                      <a:prstDash val="solid"/>
+                      <a:round/>
+                      <a:headEnd type="none" w="med" len="med"/>
+                      <a:tailEnd type="none" w="med" len="med"/>
+                    </a:lnT>
+                    <a:lnB w="12700" cap="flat" cmpd="sng" algn="ctr">
+                      <a:solidFill>
+                        <a:schemeClr val="tx1"/>
+                      </a:solidFill>
+                      <a:prstDash val="solid"/>
+                      <a:round/>
+                      <a:headEnd type="none" w="med" len="med"/>
+                      <a:tailEnd type="none" w="med" len="med"/>
+                    </a:lnB>
+                    <a:noFill/>
+                  </a:tcPr>
+                </a:tc>
+                <a:tc>
+                  <a:txBody>
+                    <a:bodyPr/>
+                    <a:lstStyle/>
+                    <a:p>
+                      <a:endParaRPr lang="en-US" sz="1000" dirty="0"/>
+                    </a:p>
+                  </a:txBody>
+                  <a:tcPr marL="65250" marR="65250" marT="32625" marB="32625">
+                    <a:lnL w="12700" cap="flat" cmpd="sng" algn="ctr">
+                      <a:solidFill>
+                        <a:schemeClr val="tx1"/>
+                      </a:solidFill>
+                      <a:prstDash val="solid"/>
+                      <a:round/>
+                      <a:headEnd type="none" w="med" len="med"/>
+                      <a:tailEnd type="none" w="med" len="med"/>
+                    </a:lnL>
+                    <a:lnR w="12700" cap="flat" cmpd="sng" algn="ctr">
+                      <a:solidFill>
+                        <a:schemeClr val="tx1"/>
+                      </a:solidFill>
+                      <a:prstDash val="solid"/>
+                      <a:round/>
+                      <a:headEnd type="none" w="med" len="med"/>
+                      <a:tailEnd type="none" w="med" len="med"/>
+                    </a:lnR>
+                    <a:lnT w="12700" cap="flat" cmpd="sng" algn="ctr">
+                      <a:solidFill>
+                        <a:schemeClr val="tx1"/>
+                      </a:solidFill>
+                      <a:prstDash val="solid"/>
+                      <a:round/>
+                      <a:headEnd type="none" w="med" len="med"/>
+                      <a:tailEnd type="none" w="med" len="med"/>
+                    </a:lnT>
+                    <a:lnB w="12700" cap="flat" cmpd="sng" algn="ctr">
+                      <a:solidFill>
+                        <a:schemeClr val="tx1"/>
+                      </a:solidFill>
+                      <a:prstDash val="solid"/>
+                      <a:round/>
+                      <a:headEnd type="none" w="med" len="med"/>
+                      <a:tailEnd type="none" w="med" len="med"/>
+                    </a:lnB>
+                    <a:noFill/>
+                  </a:tcPr>
+                </a:tc>
+                <a:extLst>
+                  <a:ext uri="{0D108BD9-81ED-4DB2-BD59-A6C34878D82A}">
+                    <a16:rowId xmlns:a16="http://schemas.microsoft.com/office/drawing/2014/main" val="2188307625"/>
+                  </a:ext>
+                </a:extLst>
+              </a:tr>
+            </a:tbl>
+          </a:graphicData>
+        </a:graphic>
+      </p:graphicFrame>
+      <p:sp>
+        <p:nvSpPr>
+          <p:cNvPr id="5" name="Rectangle 4">
+            <a:extLst>
+              <a:ext uri="{FF2B5EF4-FFF2-40B4-BE49-F238E27FC236}">
+                <a16:creationId xmlns:a16="http://schemas.microsoft.com/office/drawing/2014/main" id="{0F8ACF3A-2BF0-499C-AA81-72B847C3FB26}"/>
+              </a:ext>
+            </a:extLst>
+          </p:cNvPr>
+          <p:cNvSpPr/>
+          <p:nvPr/>
+        </p:nvSpPr>
+        <p:spPr>
+          <a:xfrm>
+            <a:off x="862831" y="879996"/>
+            <a:ext cx="5233169" cy="3763400"/>
+          </a:xfrm>
+          <a:prstGeom prst="rect">
+            <a:avLst/>
+          </a:prstGeom>
+          <a:noFill/>
+        </p:spPr>
+        <p:style>
+          <a:lnRef idx="2">
+            <a:schemeClr val="accent1">
+              <a:shade val="50000"/>
+            </a:schemeClr>
+          </a:lnRef>
+          <a:fillRef idx="1">
+            <a:schemeClr val="accent1"/>
+          </a:fillRef>
+          <a:effectRef idx="0">
+            <a:schemeClr val="accent1"/>
+          </a:effectRef>
+          <a:fontRef idx="minor">
+            <a:schemeClr val="lt1"/>
+          </a:fontRef>
+        </p:style>
+        <p:txBody>
+          <a:bodyPr rtlCol="0" anchor="ctr"/>
+          <a:lstStyle/>
+          <a:p>
+            <a:pPr algn="ctr"/>
+            <a:endParaRPr lang="en-US"/>
+          </a:p>
+        </p:txBody>
+      </p:sp>
+      <p:sp>
+        <p:nvSpPr>
+          <p:cNvPr id="6" name="Rectangle 5">
+            <a:extLst>
+              <a:ext uri="{FF2B5EF4-FFF2-40B4-BE49-F238E27FC236}">
+                <a16:creationId xmlns:a16="http://schemas.microsoft.com/office/drawing/2014/main" id="{6D7E6634-C737-4DFE-9AF2-6CB031934AFD}"/>
+              </a:ext>
+            </a:extLst>
+          </p:cNvPr>
+          <p:cNvSpPr/>
+          <p:nvPr/>
+        </p:nvSpPr>
+        <p:spPr>
+          <a:xfrm>
+            <a:off x="59653" y="1304092"/>
+            <a:ext cx="1011766" cy="410943"/>
+          </a:xfrm>
+          <a:prstGeom prst="rect">
+            <a:avLst/>
+          </a:prstGeom>
+        </p:spPr>
+        <p:style>
+          <a:lnRef idx="2">
+            <a:schemeClr val="dk1">
+              <a:shade val="50000"/>
+            </a:schemeClr>
+          </a:lnRef>
+          <a:fillRef idx="1">
+            <a:schemeClr val="dk1"/>
+          </a:fillRef>
+          <a:effectRef idx="0">
+            <a:schemeClr val="dk1"/>
+          </a:effectRef>
+          <a:fontRef idx="minor">
+            <a:schemeClr val="lt1"/>
+          </a:fontRef>
+        </p:style>
+        <p:txBody>
+          <a:bodyPr rtlCol="0" anchor="ctr"/>
+          <a:lstStyle/>
+          <a:p>
+            <a:pPr algn="ctr"/>
+            <a:r>
+              <a:rPr lang="en-US" dirty="0"/>
+              <a:t>Row 0</a:t>
+            </a:r>
+          </a:p>
+        </p:txBody>
+      </p:sp>
+      <p:sp>
+        <p:nvSpPr>
+          <p:cNvPr id="7" name="Arrow: Down 6">
+            <a:extLst>
+              <a:ext uri="{FF2B5EF4-FFF2-40B4-BE49-F238E27FC236}">
+                <a16:creationId xmlns:a16="http://schemas.microsoft.com/office/drawing/2014/main" id="{0223C531-511A-4097-BF3C-3EBC8D5A57FB}"/>
+              </a:ext>
+            </a:extLst>
+          </p:cNvPr>
+          <p:cNvSpPr/>
+          <p:nvPr/>
+        </p:nvSpPr>
+        <p:spPr>
+          <a:xfrm>
+            <a:off x="396395" y="1765438"/>
+            <a:ext cx="392546" cy="1671781"/>
+          </a:xfrm>
+          <a:prstGeom prst="downArrow">
+            <a:avLst/>
+          </a:prstGeom>
+          <a:solidFill>
+            <a:srgbClr val="FF0000"/>
+          </a:solidFill>
+          <a:ln>
+            <a:solidFill>
+              <a:srgbClr val="FF0000"/>
+            </a:solidFill>
+          </a:ln>
+        </p:spPr>
+        <p:style>
+          <a:lnRef idx="2">
+            <a:schemeClr val="accent1">
+              <a:shade val="50000"/>
+            </a:schemeClr>
+          </a:lnRef>
+          <a:fillRef idx="1">
+            <a:schemeClr val="accent1"/>
+          </a:fillRef>
+          <a:effectRef idx="0">
+            <a:schemeClr val="accent1"/>
+          </a:effectRef>
+          <a:fontRef idx="minor">
+            <a:schemeClr val="lt1"/>
+          </a:fontRef>
+        </p:style>
+        <p:txBody>
+          <a:bodyPr rtlCol="0" anchor="ctr"/>
+          <a:lstStyle/>
+          <a:p>
+            <a:pPr algn="ctr"/>
+            <a:endParaRPr lang="en-US"/>
+          </a:p>
+        </p:txBody>
+      </p:sp>
+      <p:sp>
+        <p:nvSpPr>
+          <p:cNvPr id="8" name="Rectangle 7">
+            <a:extLst>
+              <a:ext uri="{FF2B5EF4-FFF2-40B4-BE49-F238E27FC236}">
+                <a16:creationId xmlns:a16="http://schemas.microsoft.com/office/drawing/2014/main" id="{8A759FEA-A655-4159-9DF6-4A9587EA130D}"/>
+              </a:ext>
+            </a:extLst>
+          </p:cNvPr>
+          <p:cNvSpPr/>
+          <p:nvPr/>
+        </p:nvSpPr>
+        <p:spPr>
+          <a:xfrm>
+            <a:off x="753603" y="668219"/>
+            <a:ext cx="1496290" cy="392547"/>
+          </a:xfrm>
+          <a:prstGeom prst="rect">
+            <a:avLst/>
+          </a:prstGeom>
+        </p:spPr>
+        <p:style>
+          <a:lnRef idx="2">
+            <a:schemeClr val="dk1">
+              <a:shade val="50000"/>
+            </a:schemeClr>
+          </a:lnRef>
+          <a:fillRef idx="1">
+            <a:schemeClr val="dk1"/>
+          </a:fillRef>
+          <a:effectRef idx="0">
+            <a:schemeClr val="dk1"/>
+          </a:effectRef>
+          <a:fontRef idx="minor">
+            <a:schemeClr val="lt1"/>
+          </a:fontRef>
+        </p:style>
+        <p:txBody>
+          <a:bodyPr rtlCol="0" anchor="ctr"/>
+          <a:lstStyle/>
+          <a:p>
+            <a:pPr algn="ctr"/>
+            <a:r>
+              <a:rPr lang="en-US" dirty="0"/>
+              <a:t>Column  0</a:t>
+            </a:r>
+          </a:p>
+        </p:txBody>
+      </p:sp>
+      <p:sp>
+        <p:nvSpPr>
+          <p:cNvPr id="9" name="Arrow: Down 8">
+            <a:extLst>
+              <a:ext uri="{FF2B5EF4-FFF2-40B4-BE49-F238E27FC236}">
+                <a16:creationId xmlns:a16="http://schemas.microsoft.com/office/drawing/2014/main" id="{FBDD6D6B-F5A1-405B-A114-3C3DCD6D64C2}"/>
+              </a:ext>
+            </a:extLst>
+          </p:cNvPr>
+          <p:cNvSpPr/>
+          <p:nvPr/>
+        </p:nvSpPr>
+        <p:spPr>
+          <a:xfrm rot="16200000">
+            <a:off x="2998738" y="44105"/>
+            <a:ext cx="392546" cy="1671781"/>
+          </a:xfrm>
+          <a:prstGeom prst="downArrow">
+            <a:avLst/>
+          </a:prstGeom>
+          <a:solidFill>
+            <a:srgbClr val="FF0000"/>
+          </a:solidFill>
+          <a:ln>
+            <a:solidFill>
+              <a:srgbClr val="FF0000"/>
+            </a:solidFill>
+          </a:ln>
+        </p:spPr>
+        <p:style>
+          <a:lnRef idx="2">
+            <a:schemeClr val="accent1">
+              <a:shade val="50000"/>
+            </a:schemeClr>
+          </a:lnRef>
+          <a:fillRef idx="1">
+            <a:schemeClr val="accent1"/>
+          </a:fillRef>
+          <a:effectRef idx="0">
+            <a:schemeClr val="accent1"/>
+          </a:effectRef>
+          <a:fontRef idx="minor">
+            <a:schemeClr val="lt1"/>
+          </a:fontRef>
+        </p:style>
+        <p:txBody>
+          <a:bodyPr rtlCol="0" anchor="ctr"/>
+          <a:lstStyle/>
+          <a:p>
+            <a:pPr algn="ctr"/>
+            <a:endParaRPr lang="en-US"/>
+          </a:p>
+        </p:txBody>
+      </p:sp>
+      <p:sp>
+        <p:nvSpPr>
+          <p:cNvPr id="10" name="TextBox 9">
+            <a:extLst>
+              <a:ext uri="{FF2B5EF4-FFF2-40B4-BE49-F238E27FC236}">
+                <a16:creationId xmlns:a16="http://schemas.microsoft.com/office/drawing/2014/main" id="{18251125-2E68-4257-A8F5-BFCB52A933F8}"/>
+              </a:ext>
+            </a:extLst>
+          </p:cNvPr>
+          <p:cNvSpPr txBox="1"/>
+          <p:nvPr/>
+        </p:nvSpPr>
+        <p:spPr>
+          <a:xfrm>
+            <a:off x="135467" y="76200"/>
+            <a:ext cx="4394200" cy="523220"/>
+          </a:xfrm>
+          <a:prstGeom prst="rect">
+            <a:avLst/>
+          </a:prstGeom>
+          <a:noFill/>
+        </p:spPr>
+        <p:txBody>
+          <a:bodyPr wrap="square" rtlCol="0">
+            <a:spAutoFit/>
+          </a:bodyPr>
+          <a:lstStyle/>
+          <a:p>
+            <a:r>
+              <a:rPr lang="en-US" sz="2800" b="1" dirty="0">
+                <a:solidFill>
+                  <a:schemeClr val="bg1"/>
+                </a:solidFill>
+              </a:rPr>
+              <a:t>Grid Format</a:t>
+            </a:r>
+          </a:p>
+        </p:txBody>
+      </p:sp>
+      <p:pic>
+        <p:nvPicPr>
+          <p:cNvPr id="12" name="Picture 11" descr="A screen shot of a computer&#10;&#10;Description automatically generated with low confidence">
+            <a:extLst>
+              <a:ext uri="{FF2B5EF4-FFF2-40B4-BE49-F238E27FC236}">
+                <a16:creationId xmlns:a16="http://schemas.microsoft.com/office/drawing/2014/main" id="{7063A1CF-9A81-4203-8784-7CF899568F94}"/>
+              </a:ext>
+            </a:extLst>
+          </p:cNvPr>
+          <p:cNvPicPr>
+            <a:picLocks noChangeAspect="1"/>
+          </p:cNvPicPr>
+          <p:nvPr/>
+        </p:nvPicPr>
+        <p:blipFill>
+          <a:blip r:embed="rId2"/>
+          <a:stretch>
+            <a:fillRect/>
+          </a:stretch>
+        </p:blipFill>
+        <p:spPr>
+          <a:xfrm>
+            <a:off x="6562436" y="907269"/>
+            <a:ext cx="5381625" cy="3952875"/>
+          </a:xfrm>
+          <a:prstGeom prst="rect">
+            <a:avLst/>
+          </a:prstGeom>
+        </p:spPr>
+      </p:pic>
+    </p:spTree>
+    <p:extLst>
+      <p:ext uri="{BB962C8B-B14F-4D97-AF65-F5344CB8AC3E}">
+        <p14:creationId xmlns:p14="http://schemas.microsoft.com/office/powerpoint/2010/main" val="2162598990"/>
+      </p:ext>
+    </p:extLst>
+  </p:cSld>
+  <p:clrMapOvr>
+    <a:masterClrMapping/>
+  </p:clrMapOvr>
+</p:sld>
+</file>
+
+<file path=ppt/slides/slide7.xml><?xml version="1.0" encoding="utf-8"?>
+<p:sld xmlns:a="http://schemas.openxmlformats.org/drawingml/2006/main" xmlns:r="http://schemas.openxmlformats.org/officeDocument/2006/relationships" xmlns:p="http://schemas.openxmlformats.org/presentationml/2006/main">
+  <p:cSld>
+    <p:spTree>
+      <p:nvGrpSpPr>
+        <p:cNvPr id="1" name=""/>
+        <p:cNvGrpSpPr/>
+        <p:nvPr/>
+      </p:nvGrpSpPr>
+      <p:grpSpPr>
+        <a:xfrm>
+          <a:off x="0" y="0"/>
+          <a:ext cx="0" cy="0"/>
+          <a:chOff x="0" y="0"/>
+          <a:chExt cx="0" cy="0"/>
+        </a:xfrm>
+      </p:grpSpPr>
+      <p:sp>
+        <p:nvSpPr>
+          <p:cNvPr id="4" name="TextBox 3">
+            <a:extLst>
+              <a:ext uri="{FF2B5EF4-FFF2-40B4-BE49-F238E27FC236}">
+                <a16:creationId xmlns:a16="http://schemas.microsoft.com/office/drawing/2014/main" id="{6A6B4C22-E313-429D-B35C-68404D065B29}"/>
+              </a:ext>
+            </a:extLst>
+          </p:cNvPr>
+          <p:cNvSpPr txBox="1"/>
+          <p:nvPr/>
+        </p:nvSpPr>
+        <p:spPr>
+          <a:xfrm>
+            <a:off x="135467" y="76200"/>
+            <a:ext cx="4394200" cy="523220"/>
+          </a:xfrm>
+          <a:prstGeom prst="rect">
+            <a:avLst/>
+          </a:prstGeom>
+          <a:noFill/>
+        </p:spPr>
+        <p:txBody>
+          <a:bodyPr wrap="square" rtlCol="0">
+            <a:spAutoFit/>
+          </a:bodyPr>
+          <a:lstStyle/>
+          <a:p>
+            <a:r>
+              <a:rPr lang="en-US" sz="2800" b="1" dirty="0">
+                <a:solidFill>
+                  <a:schemeClr val="bg1"/>
+                </a:solidFill>
+              </a:rPr>
+              <a:t>HsmartWindowWPF</a:t>
+            </a:r>
+          </a:p>
+        </p:txBody>
+      </p:sp>
+      <p:pic>
+        <p:nvPicPr>
+          <p:cNvPr id="6" name="Picture 5" descr="A picture containing graphical user interface&#10;&#10;Description automatically generated">
+            <a:extLst>
+              <a:ext uri="{FF2B5EF4-FFF2-40B4-BE49-F238E27FC236}">
+                <a16:creationId xmlns:a16="http://schemas.microsoft.com/office/drawing/2014/main" id="{90ABF4F2-D3D8-4847-972E-4497F4D3F44C}"/>
+              </a:ext>
+            </a:extLst>
+          </p:cNvPr>
+          <p:cNvPicPr>
+            <a:picLocks noChangeAspect="1"/>
+          </p:cNvPicPr>
+          <p:nvPr/>
+        </p:nvPicPr>
+        <p:blipFill>
+          <a:blip r:embed="rId2"/>
+          <a:stretch>
+            <a:fillRect/>
+          </a:stretch>
+        </p:blipFill>
+        <p:spPr>
+          <a:xfrm>
+            <a:off x="194734" y="816986"/>
+            <a:ext cx="5794639" cy="3865852"/>
+          </a:xfrm>
+          <a:prstGeom prst="rect">
+            <a:avLst/>
+          </a:prstGeom>
+        </p:spPr>
+      </p:pic>
+      <p:pic>
+        <p:nvPicPr>
+          <p:cNvPr id="8" name="Picture 7" descr="Text&#10;&#10;Description automatically generated">
+            <a:extLst>
+              <a:ext uri="{FF2B5EF4-FFF2-40B4-BE49-F238E27FC236}">
+                <a16:creationId xmlns:a16="http://schemas.microsoft.com/office/drawing/2014/main" id="{79E77B0F-6B43-44E9-A4E1-7C68A46FF508}"/>
+              </a:ext>
+            </a:extLst>
+          </p:cNvPr>
+          <p:cNvPicPr>
+            <a:picLocks noChangeAspect="1"/>
+          </p:cNvPicPr>
+          <p:nvPr/>
+        </p:nvPicPr>
+        <p:blipFill>
+          <a:blip r:embed="rId3"/>
+          <a:stretch>
+            <a:fillRect/>
+          </a:stretch>
+        </p:blipFill>
+        <p:spPr>
+          <a:xfrm>
+            <a:off x="4005791" y="865477"/>
+            <a:ext cx="7991475" cy="1057275"/>
+          </a:xfrm>
+          <a:prstGeom prst="rect">
+            <a:avLst/>
+          </a:prstGeom>
+        </p:spPr>
+      </p:pic>
+      <p:sp>
+        <p:nvSpPr>
+          <p:cNvPr id="10" name="TextBox 9">
+            <a:extLst>
+              <a:ext uri="{FF2B5EF4-FFF2-40B4-BE49-F238E27FC236}">
+                <a16:creationId xmlns:a16="http://schemas.microsoft.com/office/drawing/2014/main" id="{D0DB04AB-9061-41C9-95D5-CAA7FF34C708}"/>
+              </a:ext>
+            </a:extLst>
+          </p:cNvPr>
+          <p:cNvSpPr txBox="1"/>
+          <p:nvPr/>
+        </p:nvSpPr>
+        <p:spPr>
+          <a:xfrm>
+            <a:off x="6326908" y="2692645"/>
+            <a:ext cx="5670357" cy="1477328"/>
+          </a:xfrm>
+          <a:prstGeom prst="rect">
+            <a:avLst/>
+          </a:prstGeom>
+          <a:noFill/>
+        </p:spPr>
+        <p:txBody>
+          <a:bodyPr wrap="square">
+            <a:spAutoFit/>
+          </a:bodyPr>
+          <a:lstStyle/>
+          <a:p>
+            <a:r>
+              <a:rPr lang="en-US" sz="1800" dirty="0">
+                <a:solidFill>
+                  <a:srgbClr val="000000"/>
+                </a:solidFill>
+                <a:latin typeface="Consolas" panose="020B0609020204030204" pitchFamily="49" charset="0"/>
+              </a:rPr>
+              <a:t> </a:t>
+            </a:r>
+            <a:r>
+              <a:rPr lang="en-US" sz="1800" dirty="0">
+                <a:solidFill>
+                  <a:srgbClr val="0000FF"/>
+                </a:solidFill>
+                <a:latin typeface="Consolas" panose="020B0609020204030204" pitchFamily="49" charset="0"/>
+              </a:rPr>
+              <a:t>&lt;</a:t>
+            </a:r>
+            <a:r>
+              <a:rPr lang="en-US" sz="1800" dirty="0">
+                <a:solidFill>
+                  <a:srgbClr val="A31515"/>
+                </a:solidFill>
+                <a:latin typeface="Consolas" panose="020B0609020204030204" pitchFamily="49" charset="0"/>
+              </a:rPr>
+              <a:t>HalconDotNet</a:t>
+            </a:r>
+            <a:r>
+              <a:rPr lang="en-US" sz="1800" dirty="0">
+                <a:solidFill>
+                  <a:srgbClr val="0000FF"/>
+                </a:solidFill>
+                <a:latin typeface="Consolas" panose="020B0609020204030204" pitchFamily="49" charset="0"/>
+              </a:rPr>
+              <a:t>:</a:t>
+            </a:r>
+            <a:r>
+              <a:rPr lang="en-US" sz="1800" dirty="0">
+                <a:solidFill>
+                  <a:srgbClr val="A31515"/>
+                </a:solidFill>
+                <a:latin typeface="Consolas" panose="020B0609020204030204" pitchFamily="49" charset="0"/>
+              </a:rPr>
+              <a:t>HIconicDisplayObjectWPF</a:t>
+            </a:r>
+            <a:r>
+              <a:rPr lang="en-US" sz="1800" dirty="0">
+                <a:solidFill>
+                  <a:srgbClr val="FF0000"/>
+                </a:solidFill>
+                <a:latin typeface="Consolas" panose="020B0609020204030204" pitchFamily="49" charset="0"/>
+              </a:rPr>
+              <a:t> IconicObject</a:t>
+            </a:r>
+            <a:r>
+              <a:rPr lang="en-US" sz="1800" dirty="0">
+                <a:solidFill>
+                  <a:srgbClr val="0000FF"/>
+                </a:solidFill>
+                <a:highlight>
+                  <a:srgbClr val="FFFF00"/>
+                </a:highlight>
+                <a:latin typeface="Consolas" panose="020B0609020204030204" pitchFamily="49" charset="0"/>
+              </a:rPr>
+              <a:t>="{</a:t>
+            </a:r>
+            <a:r>
+              <a:rPr lang="en-US" sz="1800" dirty="0">
+                <a:solidFill>
+                  <a:srgbClr val="A31515"/>
+                </a:solidFill>
+                <a:highlight>
+                  <a:srgbClr val="FFFF00"/>
+                </a:highlight>
+                <a:latin typeface="Consolas" panose="020B0609020204030204" pitchFamily="49" charset="0"/>
+              </a:rPr>
+              <a:t>Binding</a:t>
+            </a:r>
+            <a:r>
+              <a:rPr lang="en-US" sz="1800" dirty="0">
+                <a:solidFill>
+                  <a:srgbClr val="FF0000"/>
+                </a:solidFill>
+                <a:highlight>
+                  <a:srgbClr val="FFFF00"/>
+                </a:highlight>
+                <a:latin typeface="Consolas" panose="020B0609020204030204" pitchFamily="49" charset="0"/>
+              </a:rPr>
+              <a:t> DisplayImage</a:t>
+            </a:r>
+            <a:r>
+              <a:rPr lang="en-US" sz="1800" dirty="0">
+                <a:solidFill>
+                  <a:srgbClr val="0000FF"/>
+                </a:solidFill>
+                <a:highlight>
+                  <a:srgbClr val="FFFF00"/>
+                </a:highlight>
+                <a:latin typeface="Consolas" panose="020B0609020204030204" pitchFamily="49" charset="0"/>
+              </a:rPr>
+              <a:t>}"/&gt;</a:t>
+            </a:r>
+            <a:endParaRPr lang="en-US" sz="1800" dirty="0">
+              <a:solidFill>
+                <a:srgbClr val="000000"/>
+              </a:solidFill>
+              <a:highlight>
+                <a:srgbClr val="FFFF00"/>
+              </a:highlight>
+              <a:latin typeface="Consolas" panose="020B0609020204030204" pitchFamily="49" charset="0"/>
+            </a:endParaRPr>
+          </a:p>
+          <a:p>
+            <a:r>
+              <a:rPr lang="en-US" sz="1800" dirty="0">
+                <a:solidFill>
+                  <a:srgbClr val="000000"/>
+                </a:solidFill>
+                <a:latin typeface="Consolas" panose="020B0609020204030204" pitchFamily="49" charset="0"/>
+              </a:rPr>
+              <a:t>                </a:t>
+            </a:r>
+            <a:r>
+              <a:rPr lang="en-US" sz="1800" dirty="0">
+                <a:solidFill>
+                  <a:srgbClr val="0000FF"/>
+                </a:solidFill>
+                <a:latin typeface="Consolas" panose="020B0609020204030204" pitchFamily="49" charset="0"/>
+              </a:rPr>
+              <a:t>&lt;</a:t>
+            </a:r>
+            <a:r>
+              <a:rPr lang="en-US" sz="1800" dirty="0">
+                <a:solidFill>
+                  <a:srgbClr val="A31515"/>
+                </a:solidFill>
+                <a:latin typeface="Consolas" panose="020B0609020204030204" pitchFamily="49" charset="0"/>
+              </a:rPr>
+              <a:t>HalconDotNet</a:t>
+            </a:r>
+            <a:r>
+              <a:rPr lang="en-US" sz="1800" dirty="0">
+                <a:solidFill>
+                  <a:srgbClr val="0000FF"/>
+                </a:solidFill>
+                <a:latin typeface="Consolas" panose="020B0609020204030204" pitchFamily="49" charset="0"/>
+              </a:rPr>
+              <a:t>:</a:t>
+            </a:r>
+            <a:r>
+              <a:rPr lang="en-US" sz="1800" dirty="0">
+                <a:solidFill>
+                  <a:srgbClr val="A31515"/>
+                </a:solidFill>
+                <a:latin typeface="Consolas" panose="020B0609020204030204" pitchFamily="49" charset="0"/>
+              </a:rPr>
+              <a:t>HIconicDisplayObjectWPF</a:t>
+            </a:r>
+            <a:r>
+              <a:rPr lang="en-US" sz="1800" dirty="0">
+                <a:solidFill>
+                  <a:srgbClr val="FF0000"/>
+                </a:solidFill>
+                <a:latin typeface="Consolas" panose="020B0609020204030204" pitchFamily="49" charset="0"/>
+              </a:rPr>
+              <a:t> IconicObject</a:t>
+            </a:r>
+            <a:r>
+              <a:rPr lang="en-US" sz="1800" dirty="0">
+                <a:solidFill>
+                  <a:srgbClr val="0000FF"/>
+                </a:solidFill>
+                <a:highlight>
+                  <a:srgbClr val="FFFF00"/>
+                </a:highlight>
+                <a:latin typeface="Consolas" panose="020B0609020204030204" pitchFamily="49" charset="0"/>
+              </a:rPr>
+              <a:t>="{</a:t>
+            </a:r>
+            <a:r>
+              <a:rPr lang="en-US" sz="1800" dirty="0">
+                <a:solidFill>
+                  <a:srgbClr val="A31515"/>
+                </a:solidFill>
+                <a:highlight>
+                  <a:srgbClr val="FFFF00"/>
+                </a:highlight>
+                <a:latin typeface="Consolas" panose="020B0609020204030204" pitchFamily="49" charset="0"/>
+              </a:rPr>
+              <a:t>Binding</a:t>
+            </a:r>
+            <a:r>
+              <a:rPr lang="en-US" sz="1800" dirty="0">
+                <a:solidFill>
+                  <a:srgbClr val="FF0000"/>
+                </a:solidFill>
+                <a:highlight>
+                  <a:srgbClr val="FFFF00"/>
+                </a:highlight>
+                <a:latin typeface="Consolas" panose="020B0609020204030204" pitchFamily="49" charset="0"/>
+              </a:rPr>
+              <a:t> DisplayRegion</a:t>
+            </a:r>
+            <a:r>
+              <a:rPr lang="en-US" sz="1800" dirty="0">
+                <a:solidFill>
+                  <a:srgbClr val="0000FF"/>
+                </a:solidFill>
+                <a:highlight>
+                  <a:srgbClr val="FFFF00"/>
+                </a:highlight>
+                <a:latin typeface="Consolas" panose="020B0609020204030204" pitchFamily="49" charset="0"/>
+              </a:rPr>
+              <a:t>}"</a:t>
+            </a:r>
+            <a:r>
+              <a:rPr lang="en-US" sz="1800" dirty="0">
+                <a:solidFill>
+                  <a:srgbClr val="000000"/>
+                </a:solidFill>
+                <a:highlight>
+                  <a:srgbClr val="FFFF00"/>
+                </a:highlight>
+                <a:latin typeface="Consolas" panose="020B0609020204030204" pitchFamily="49" charset="0"/>
+              </a:rPr>
+              <a:t> </a:t>
+            </a:r>
+            <a:endParaRPr lang="en-US" dirty="0">
+              <a:highlight>
+                <a:srgbClr val="FFFF00"/>
+              </a:highlight>
+            </a:endParaRPr>
+          </a:p>
+        </p:txBody>
+      </p:sp>
+    </p:spTree>
+    <p:extLst>
+      <p:ext uri="{BB962C8B-B14F-4D97-AF65-F5344CB8AC3E}">
+        <p14:creationId xmlns:p14="http://schemas.microsoft.com/office/powerpoint/2010/main" val="3014775126"/>
+      </p:ext>
+    </p:extLst>
+  </p:cSld>
+  <p:clrMapOvr>
+    <a:masterClrMapping/>
+  </p:clrMapOvr>
+</p:sld>
+</file>
+
+<file path=ppt/slides/slide8.xml><?xml version="1.0" encoding="utf-8"?>
+<p:sld xmlns:a="http://schemas.openxmlformats.org/drawingml/2006/main" xmlns:r="http://schemas.openxmlformats.org/officeDocument/2006/relationships" xmlns:p="http://schemas.openxmlformats.org/presentationml/2006/main">
+  <p:cSld>
+    <p:spTree>
+      <p:nvGrpSpPr>
+        <p:cNvPr id="1" name=""/>
+        <p:cNvGrpSpPr/>
+        <p:nvPr/>
+      </p:nvGrpSpPr>
+      <p:grpSpPr>
+        <a:xfrm>
+          <a:off x="0" y="0"/>
+          <a:ext cx="0" cy="0"/>
+          <a:chOff x="0" y="0"/>
+          <a:chExt cx="0" cy="0"/>
+        </a:xfrm>
+      </p:grpSpPr>
+      <p:sp>
+        <p:nvSpPr>
+          <p:cNvPr id="4" name="TextBox 3">
+            <a:extLst>
+              <a:ext uri="{FF2B5EF4-FFF2-40B4-BE49-F238E27FC236}">
+                <a16:creationId xmlns:a16="http://schemas.microsoft.com/office/drawing/2014/main" id="{4D50AA20-6889-4D67-B037-57378F223387}"/>
+              </a:ext>
+            </a:extLst>
+          </p:cNvPr>
+          <p:cNvSpPr txBox="1"/>
+          <p:nvPr/>
+        </p:nvSpPr>
+        <p:spPr>
+          <a:xfrm>
+            <a:off x="135467" y="76200"/>
+            <a:ext cx="4394200" cy="523220"/>
+          </a:xfrm>
+          <a:prstGeom prst="rect">
+            <a:avLst/>
+          </a:prstGeom>
+          <a:noFill/>
+        </p:spPr>
+        <p:txBody>
+          <a:bodyPr wrap="square" rtlCol="0">
+            <a:spAutoFit/>
+          </a:bodyPr>
+          <a:lstStyle/>
+          <a:p>
+            <a:r>
+              <a:rPr lang="en-US" sz="2800" b="1" dirty="0">
+                <a:solidFill>
+                  <a:schemeClr val="bg1"/>
+                </a:solidFill>
+              </a:rPr>
+              <a:t>Button and Function</a:t>
+            </a:r>
+          </a:p>
+        </p:txBody>
+      </p:sp>
+      <p:pic>
+        <p:nvPicPr>
+          <p:cNvPr id="6" name="Picture 5" descr="Graphical user interface&#10;&#10;Description automatically generated with medium confidence">
+            <a:extLst>
+              <a:ext uri="{FF2B5EF4-FFF2-40B4-BE49-F238E27FC236}">
+                <a16:creationId xmlns:a16="http://schemas.microsoft.com/office/drawing/2014/main" id="{A5780AAE-E805-4254-ADA5-C6AB2911A924}"/>
+              </a:ext>
+            </a:extLst>
+          </p:cNvPr>
+          <p:cNvPicPr>
+            <a:picLocks noChangeAspect="1"/>
+          </p:cNvPicPr>
+          <p:nvPr/>
+        </p:nvPicPr>
+        <p:blipFill>
+          <a:blip r:embed="rId2"/>
+          <a:stretch>
+            <a:fillRect/>
+          </a:stretch>
+        </p:blipFill>
+        <p:spPr>
+          <a:xfrm>
+            <a:off x="722168" y="1097828"/>
+            <a:ext cx="6591300" cy="4200525"/>
+          </a:xfrm>
+          <a:prstGeom prst="rect">
+            <a:avLst/>
+          </a:prstGeom>
+        </p:spPr>
+      </p:pic>
+      <p:pic>
+        <p:nvPicPr>
+          <p:cNvPr id="8" name="Picture 7">
+            <a:extLst>
+              <a:ext uri="{FF2B5EF4-FFF2-40B4-BE49-F238E27FC236}">
+                <a16:creationId xmlns:a16="http://schemas.microsoft.com/office/drawing/2014/main" id="{449EBEBF-8272-4A53-B310-DBC5E4FB17DB}"/>
+              </a:ext>
+            </a:extLst>
+          </p:cNvPr>
+          <p:cNvPicPr>
+            <a:picLocks noChangeAspect="1"/>
+          </p:cNvPicPr>
+          <p:nvPr/>
+        </p:nvPicPr>
+        <p:blipFill>
+          <a:blip r:embed="rId3"/>
+          <a:stretch>
+            <a:fillRect/>
+          </a:stretch>
+        </p:blipFill>
+        <p:spPr>
+          <a:xfrm>
+            <a:off x="5937682" y="1097828"/>
+            <a:ext cx="5876925" cy="590550"/>
+          </a:xfrm>
+          <a:prstGeom prst="rect">
+            <a:avLst/>
+          </a:prstGeom>
+        </p:spPr>
+      </p:pic>
+      <p:grpSp>
+        <p:nvGrpSpPr>
+          <p:cNvPr id="13" name="Group 12">
+            <a:extLst>
+              <a:ext uri="{FF2B5EF4-FFF2-40B4-BE49-F238E27FC236}">
+                <a16:creationId xmlns:a16="http://schemas.microsoft.com/office/drawing/2014/main" id="{51111713-D708-4E83-85F3-317CC98D2D48}"/>
+              </a:ext>
+            </a:extLst>
+          </p:cNvPr>
+          <p:cNvGrpSpPr/>
+          <p:nvPr/>
+        </p:nvGrpSpPr>
+        <p:grpSpPr>
+          <a:xfrm>
+            <a:off x="8290357" y="1766576"/>
+            <a:ext cx="3524250" cy="1512332"/>
+            <a:chOff x="8106712" y="2828758"/>
+            <a:chExt cx="3524250" cy="1512332"/>
+          </a:xfrm>
+        </p:grpSpPr>
+        <p:pic>
+          <p:nvPicPr>
+            <p:cNvPr id="10" name="Picture 9" descr="Text&#10;&#10;Description automatically generated">
+              <a:extLst>
+                <a:ext uri="{FF2B5EF4-FFF2-40B4-BE49-F238E27FC236}">
+                  <a16:creationId xmlns:a16="http://schemas.microsoft.com/office/drawing/2014/main" id="{FE5C56A3-07A2-43AD-A9E2-52E18F044BDE}"/>
+                </a:ext>
+              </a:extLst>
+            </p:cNvPr>
+            <p:cNvPicPr>
+              <a:picLocks noChangeAspect="1"/>
+            </p:cNvPicPr>
+            <p:nvPr/>
+          </p:nvPicPr>
+          <p:blipFill>
+            <a:blip r:embed="rId4"/>
+            <a:stretch>
+              <a:fillRect/>
+            </a:stretch>
+          </p:blipFill>
+          <p:spPr>
+            <a:xfrm>
+              <a:off x="8106712" y="3198090"/>
+              <a:ext cx="3524250" cy="1143000"/>
+            </a:xfrm>
+            <a:prstGeom prst="rect">
+              <a:avLst/>
+            </a:prstGeom>
+          </p:spPr>
+        </p:pic>
+        <p:sp>
+          <p:nvSpPr>
+            <p:cNvPr id="11" name="TextBox 10">
+              <a:extLst>
+                <a:ext uri="{FF2B5EF4-FFF2-40B4-BE49-F238E27FC236}">
+                  <a16:creationId xmlns:a16="http://schemas.microsoft.com/office/drawing/2014/main" id="{9F1774EF-2384-47AE-9C89-976E4E3CEF41}"/>
+                </a:ext>
+              </a:extLst>
+            </p:cNvPr>
+            <p:cNvSpPr txBox="1"/>
+            <p:nvPr/>
+          </p:nvSpPr>
+          <p:spPr>
+            <a:xfrm>
+              <a:off x="8106712" y="2828758"/>
+              <a:ext cx="2484582" cy="369332"/>
+            </a:xfrm>
+            <a:prstGeom prst="rect">
+              <a:avLst/>
+            </a:prstGeom>
+            <a:noFill/>
+          </p:spPr>
+          <p:txBody>
+            <a:bodyPr wrap="square" rtlCol="0">
+              <a:spAutoFit/>
+            </a:bodyPr>
+            <a:lstStyle/>
+            <a:p>
+              <a:r>
+                <a:rPr lang="en-US" dirty="0"/>
+                <a:t>Open Image button</a:t>
+              </a:r>
+            </a:p>
+          </p:txBody>
+        </p:sp>
+        <p:sp>
+          <p:nvSpPr>
+            <p:cNvPr id="12" name="Rectangle 11">
+              <a:extLst>
+                <a:ext uri="{FF2B5EF4-FFF2-40B4-BE49-F238E27FC236}">
+                  <a16:creationId xmlns:a16="http://schemas.microsoft.com/office/drawing/2014/main" id="{5E68ACDC-0EE2-4093-8DBC-2DD815106111}"/>
+                </a:ext>
+              </a:extLst>
+            </p:cNvPr>
+            <p:cNvSpPr/>
+            <p:nvPr/>
+          </p:nvSpPr>
+          <p:spPr>
+            <a:xfrm>
+              <a:off x="9282545" y="3897745"/>
+              <a:ext cx="1644073" cy="193964"/>
+            </a:xfrm>
+            <a:prstGeom prst="rect">
+              <a:avLst/>
+            </a:prstGeom>
+            <a:solidFill>
+              <a:srgbClr val="FFFF00">
+                <a:alpha val="16863"/>
+              </a:srgbClr>
+            </a:solidFill>
+            <a:ln>
+              <a:solidFill>
+                <a:srgbClr val="FF0000"/>
+              </a:solidFill>
+            </a:ln>
+          </p:spPr>
+          <p:style>
+            <a:lnRef idx="2">
+              <a:schemeClr val="accent1">
+                <a:shade val="50000"/>
+              </a:schemeClr>
+            </a:lnRef>
+            <a:fillRef idx="1">
+              <a:schemeClr val="accent1"/>
+            </a:fillRef>
+            <a:effectRef idx="0">
+              <a:schemeClr val="accent1"/>
+            </a:effectRef>
+            <a:fontRef idx="minor">
+              <a:schemeClr val="lt1"/>
+            </a:fontRef>
+          </p:style>
+          <p:txBody>
+            <a:bodyPr rtlCol="0" anchor="ctr"/>
+            <a:lstStyle/>
+            <a:p>
+              <a:pPr algn="ctr"/>
+              <a:endParaRPr lang="en-US"/>
+            </a:p>
+          </p:txBody>
+        </p:sp>
+      </p:grpSp>
+      <p:pic>
+        <p:nvPicPr>
+          <p:cNvPr id="15" name="Picture 14" descr="Text&#10;&#10;Description automatically generated">
+            <a:extLst>
+              <a:ext uri="{FF2B5EF4-FFF2-40B4-BE49-F238E27FC236}">
+                <a16:creationId xmlns:a16="http://schemas.microsoft.com/office/drawing/2014/main" id="{4D82978A-6773-419C-AB89-9EEBE4C725FD}"/>
+              </a:ext>
+            </a:extLst>
+          </p:cNvPr>
+          <p:cNvPicPr>
+            <a:picLocks noChangeAspect="1"/>
+          </p:cNvPicPr>
+          <p:nvPr/>
+        </p:nvPicPr>
+        <p:blipFill>
+          <a:blip r:embed="rId5"/>
+          <a:stretch>
+            <a:fillRect/>
+          </a:stretch>
+        </p:blipFill>
+        <p:spPr>
+          <a:xfrm>
+            <a:off x="8282421" y="3968322"/>
+            <a:ext cx="2371725" cy="2257425"/>
+          </a:xfrm>
+          <a:prstGeom prst="rect">
+            <a:avLst/>
+          </a:prstGeom>
+        </p:spPr>
+      </p:pic>
+      <p:sp>
+        <p:nvSpPr>
+          <p:cNvPr id="16" name="TextBox 15">
+            <a:extLst>
+              <a:ext uri="{FF2B5EF4-FFF2-40B4-BE49-F238E27FC236}">
+                <a16:creationId xmlns:a16="http://schemas.microsoft.com/office/drawing/2014/main" id="{BECA1077-66FF-4654-B7B8-FB02790962DE}"/>
+              </a:ext>
+            </a:extLst>
+          </p:cNvPr>
+          <p:cNvSpPr txBox="1"/>
+          <p:nvPr/>
+        </p:nvSpPr>
+        <p:spPr>
+          <a:xfrm>
+            <a:off x="8223899" y="3579093"/>
+            <a:ext cx="2484582" cy="369332"/>
+          </a:xfrm>
+          <a:prstGeom prst="rect">
+            <a:avLst/>
+          </a:prstGeom>
+          <a:noFill/>
+        </p:spPr>
+        <p:txBody>
+          <a:bodyPr wrap="square" rtlCol="0">
+            <a:spAutoFit/>
+          </a:bodyPr>
+          <a:lstStyle/>
+          <a:p>
+            <a:r>
+              <a:rPr lang="en-US" dirty="0"/>
+              <a:t>Command list</a:t>
+            </a:r>
+          </a:p>
+        </p:txBody>
+      </p:sp>
+    </p:spTree>
+    <p:extLst>
+      <p:ext uri="{BB962C8B-B14F-4D97-AF65-F5344CB8AC3E}">
+        <p14:creationId xmlns:p14="http://schemas.microsoft.com/office/powerpoint/2010/main" val="3563984872"/>
+      </p:ext>
+    </p:extLst>
+  </p:cSld>
+  <p:clrMapOvr>
+    <a:masterClrMapping/>
+  </p:clrMapOvr>
+</p:sld>
+</file>
+
 <file path=ppt/theme/theme1.xml><?xml version="1.0" encoding="utf-8"?>
 <a:theme xmlns:a="http://schemas.openxmlformats.org/drawingml/2006/main" name="Default Design">
   <a:themeElements>

</xml_diff>